<commit_message>
23/06/06: training data, reivew report
</commit_message>
<xml_diff>
--- a/Week04_0509/0509_汇报.pptx
+++ b/Week04_0509/0509_汇报.pptx
@@ -141,6 +141,30 @@
 <file path=ppt/changesInfos/changesInfo1.xml><?xml version="1.0" encoding="utf-8"?>
 <pc:chgInfo xmlns:a="http://schemas.openxmlformats.org/drawingml/2006/main" xmlns:r="http://schemas.openxmlformats.org/officeDocument/2006/relationships" xmlns:ac="http://schemas.microsoft.com/office/drawing/2013/main/command" xmlns:pc="http://schemas.microsoft.com/office/powerpoint/2013/main/command">
   <pc:docChgLst>
+    <pc:chgData name="陈实" userId="4583ffe2-5da7-45e3-8581-7f06dbfe0081" providerId="ADAL" clId="{B74AF222-B1FF-4038-A79D-C76AE134F9C1}"/>
+    <pc:docChg chg="modSld">
+      <pc:chgData name="陈实" userId="4583ffe2-5da7-45e3-8581-7f06dbfe0081" providerId="ADAL" clId="{B74AF222-B1FF-4038-A79D-C76AE134F9C1}" dt="2023-06-01T13:40:05.346" v="0" actId="1076"/>
+      <pc:docMkLst>
+        <pc:docMk/>
+      </pc:docMkLst>
+      <pc:sldChg chg="modSp mod">
+        <pc:chgData name="陈实" userId="4583ffe2-5da7-45e3-8581-7f06dbfe0081" providerId="ADAL" clId="{B74AF222-B1FF-4038-A79D-C76AE134F9C1}" dt="2023-06-01T13:40:05.346" v="0" actId="1076"/>
+        <pc:sldMkLst>
+          <pc:docMk/>
+          <pc:sldMk cId="0" sldId="282"/>
+        </pc:sldMkLst>
+        <pc:picChg chg="mod">
+          <ac:chgData name="陈实" userId="4583ffe2-5da7-45e3-8581-7f06dbfe0081" providerId="ADAL" clId="{B74AF222-B1FF-4038-A79D-C76AE134F9C1}" dt="2023-06-01T13:40:05.346" v="0" actId="1076"/>
+          <ac:picMkLst>
+            <pc:docMk/>
+            <pc:sldMk cId="0" sldId="282"/>
+            <ac:picMk id="4" creationId="{00000000-0000-0000-0000-000000000000}"/>
+          </ac:picMkLst>
+        </pc:picChg>
+      </pc:sldChg>
+    </pc:docChg>
+  </pc:docChgLst>
+  <pc:docChgLst>
     <pc:chgData name="实" userId="4583ffe2-5da7-45e3-8581-7f06dbfe0081" providerId="ADAL" clId="{19D391E2-A414-4E21-8A82-FDADDC6D2F22}"/>
     <pc:docChg chg="undo custSel modSld">
       <pc:chgData name="实" userId="4583ffe2-5da7-45e3-8581-7f06dbfe0081" providerId="ADAL" clId="{19D391E2-A414-4E21-8A82-FDADDC6D2F22}" dt="2023-05-08T14:52:14.642" v="11" actId="120"/>
@@ -249,7 +273,7 @@
           <a:p>
             <a:fld id="{B7E83350-A352-40D6-AD25-69E3F8963A9D}" type="datetimeFigureOut">
               <a:rPr lang="zh-CN" altLang="en-US" smtClean="0"/>
-              <a:t>2023/5/8</a:t>
+              <a:t>2023/6/1</a:t>
             </a:fld>
             <a:endParaRPr lang="zh-CN" altLang="en-US"/>
           </a:p>
@@ -1667,7 +1691,7 @@
           <a:p>
             <a:fld id="{0595B4A7-9DB2-4447-8021-95C708EC3C68}" type="datetimeFigureOut">
               <a:rPr lang="zh-CN" altLang="en-US" smtClean="0"/>
-              <a:t>2023/5/8</a:t>
+              <a:t>2023/6/1</a:t>
             </a:fld>
             <a:endParaRPr lang="zh-CN" altLang="en-US"/>
           </a:p>
@@ -1830,7 +1854,7 @@
           <a:p>
             <a:fld id="{0595B4A7-9DB2-4447-8021-95C708EC3C68}" type="datetimeFigureOut">
               <a:rPr lang="zh-CN" altLang="en-US" smtClean="0"/>
-              <a:t>2023/5/8</a:t>
+              <a:t>2023/6/1</a:t>
             </a:fld>
             <a:endParaRPr lang="zh-CN" altLang="en-US"/>
           </a:p>
@@ -2003,7 +2027,7 @@
           <a:p>
             <a:fld id="{0595B4A7-9DB2-4447-8021-95C708EC3C68}" type="datetimeFigureOut">
               <a:rPr lang="zh-CN" altLang="en-US" smtClean="0"/>
-              <a:t>2023/5/8</a:t>
+              <a:t>2023/6/1</a:t>
             </a:fld>
             <a:endParaRPr lang="zh-CN" altLang="en-US"/>
           </a:p>
@@ -2362,7 +2386,7 @@
           <a:p>
             <a:fld id="{0595B4A7-9DB2-4447-8021-95C708EC3C68}" type="datetimeFigureOut">
               <a:rPr lang="zh-CN" altLang="en-US" smtClean="0"/>
-              <a:t>2023/5/8</a:t>
+              <a:t>2023/6/1</a:t>
             </a:fld>
             <a:endParaRPr lang="zh-CN" altLang="en-US"/>
           </a:p>
@@ -2525,7 +2549,7 @@
           <a:p>
             <a:fld id="{0595B4A7-9DB2-4447-8021-95C708EC3C68}" type="datetimeFigureOut">
               <a:rPr lang="zh-CN" altLang="en-US" smtClean="0"/>
-              <a:t>2023/5/8</a:t>
+              <a:t>2023/6/1</a:t>
             </a:fld>
             <a:endParaRPr lang="zh-CN" altLang="en-US"/>
           </a:p>
@@ -2765,7 +2789,7 @@
           <a:p>
             <a:fld id="{0595B4A7-9DB2-4447-8021-95C708EC3C68}" type="datetimeFigureOut">
               <a:rPr lang="zh-CN" altLang="en-US" smtClean="0"/>
-              <a:t>2023/5/8</a:t>
+              <a:t>2023/6/1</a:t>
             </a:fld>
             <a:endParaRPr lang="zh-CN" altLang="en-US"/>
           </a:p>
@@ -2989,7 +3013,7 @@
           <a:p>
             <a:fld id="{0595B4A7-9DB2-4447-8021-95C708EC3C68}" type="datetimeFigureOut">
               <a:rPr lang="zh-CN" altLang="en-US" smtClean="0"/>
-              <a:t>2023/5/8</a:t>
+              <a:t>2023/6/1</a:t>
             </a:fld>
             <a:endParaRPr lang="zh-CN" altLang="en-US"/>
           </a:p>
@@ -3348,7 +3372,7 @@
           <a:p>
             <a:fld id="{0595B4A7-9DB2-4447-8021-95C708EC3C68}" type="datetimeFigureOut">
               <a:rPr lang="zh-CN" altLang="en-US" smtClean="0"/>
-              <a:t>2023/5/8</a:t>
+              <a:t>2023/6/1</a:t>
             </a:fld>
             <a:endParaRPr lang="zh-CN" altLang="en-US"/>
           </a:p>
@@ -3460,7 +3484,7 @@
           <a:p>
             <a:fld id="{0595B4A7-9DB2-4447-8021-95C708EC3C68}" type="datetimeFigureOut">
               <a:rPr lang="zh-CN" altLang="en-US" smtClean="0"/>
-              <a:t>2023/5/8</a:t>
+              <a:t>2023/6/1</a:t>
             </a:fld>
             <a:endParaRPr lang="zh-CN" altLang="en-US"/>
           </a:p>
@@ -3550,7 +3574,7 @@
           <a:p>
             <a:fld id="{0595B4A7-9DB2-4447-8021-95C708EC3C68}" type="datetimeFigureOut">
               <a:rPr lang="zh-CN" altLang="en-US" smtClean="0"/>
-              <a:t>2023/5/8</a:t>
+              <a:t>2023/6/1</a:t>
             </a:fld>
             <a:endParaRPr lang="zh-CN" altLang="en-US"/>
           </a:p>
@@ -3713,7 +3737,7 @@
           <a:p>
             <a:fld id="{0595B4A7-9DB2-4447-8021-95C708EC3C68}" type="datetimeFigureOut">
               <a:rPr lang="zh-CN" altLang="en-US" smtClean="0"/>
-              <a:t>2023/5/8</a:t>
+              <a:t>2023/6/1</a:t>
             </a:fld>
             <a:endParaRPr lang="zh-CN" altLang="en-US"/>
           </a:p>
@@ -3983,7 +4007,7 @@
           <a:p>
             <a:fld id="{0595B4A7-9DB2-4447-8021-95C708EC3C68}" type="datetimeFigureOut">
               <a:rPr lang="zh-CN" altLang="en-US" smtClean="0"/>
-              <a:t>2023/5/8</a:t>
+              <a:t>2023/6/1</a:t>
             </a:fld>
             <a:endParaRPr lang="zh-CN" altLang="en-US"/>
           </a:p>
@@ -4230,7 +4254,7 @@
           <a:p>
             <a:fld id="{0595B4A7-9DB2-4447-8021-95C708EC3C68}" type="datetimeFigureOut">
               <a:rPr lang="zh-CN" altLang="en-US" smtClean="0"/>
-              <a:t>2023/5/8</a:t>
+              <a:t>2023/6/1</a:t>
             </a:fld>
             <a:endParaRPr lang="zh-CN" altLang="en-US"/>
           </a:p>
@@ -4393,7 +4417,7 @@
           <a:p>
             <a:fld id="{0595B4A7-9DB2-4447-8021-95C708EC3C68}" type="datetimeFigureOut">
               <a:rPr lang="zh-CN" altLang="en-US" smtClean="0"/>
-              <a:t>2023/5/8</a:t>
+              <a:t>2023/6/1</a:t>
             </a:fld>
             <a:endParaRPr lang="zh-CN" altLang="en-US"/>
           </a:p>
@@ -4566,7 +4590,7 @@
           <a:p>
             <a:fld id="{0595B4A7-9DB2-4447-8021-95C708EC3C68}" type="datetimeFigureOut">
               <a:rPr lang="zh-CN" altLang="en-US" smtClean="0"/>
-              <a:t>2023/5/8</a:t>
+              <a:t>2023/6/1</a:t>
             </a:fld>
             <a:endParaRPr lang="zh-CN" altLang="en-US"/>
           </a:p>
@@ -4980,7 +5004,7 @@
           <a:p>
             <a:fld id="{0595B4A7-9DB2-4447-8021-95C708EC3C68}" type="datetimeFigureOut">
               <a:rPr lang="zh-CN" altLang="en-US" smtClean="0"/>
-              <a:t>2023/5/8</a:t>
+              <a:t>2023/6/1</a:t>
             </a:fld>
             <a:endParaRPr lang="zh-CN" altLang="en-US"/>
           </a:p>
@@ -5204,7 +5228,7 @@
           <a:p>
             <a:fld id="{0595B4A7-9DB2-4447-8021-95C708EC3C68}" type="datetimeFigureOut">
               <a:rPr lang="zh-CN" altLang="en-US" smtClean="0"/>
-              <a:t>2023/5/8</a:t>
+              <a:t>2023/6/1</a:t>
             </a:fld>
             <a:endParaRPr lang="zh-CN" altLang="en-US"/>
           </a:p>
@@ -5563,7 +5587,7 @@
           <a:p>
             <a:fld id="{0595B4A7-9DB2-4447-8021-95C708EC3C68}" type="datetimeFigureOut">
               <a:rPr lang="zh-CN" altLang="en-US" smtClean="0"/>
-              <a:t>2023/5/8</a:t>
+              <a:t>2023/6/1</a:t>
             </a:fld>
             <a:endParaRPr lang="zh-CN" altLang="en-US"/>
           </a:p>
@@ -5675,7 +5699,7 @@
           <a:p>
             <a:fld id="{0595B4A7-9DB2-4447-8021-95C708EC3C68}" type="datetimeFigureOut">
               <a:rPr lang="zh-CN" altLang="en-US" smtClean="0"/>
-              <a:t>2023/5/8</a:t>
+              <a:t>2023/6/1</a:t>
             </a:fld>
             <a:endParaRPr lang="zh-CN" altLang="en-US"/>
           </a:p>
@@ -5765,7 +5789,7 @@
           <a:p>
             <a:fld id="{0595B4A7-9DB2-4447-8021-95C708EC3C68}" type="datetimeFigureOut">
               <a:rPr lang="zh-CN" altLang="en-US" smtClean="0"/>
-              <a:t>2023/5/8</a:t>
+              <a:t>2023/6/1</a:t>
             </a:fld>
             <a:endParaRPr lang="zh-CN" altLang="en-US"/>
           </a:p>
@@ -6035,7 +6059,7 @@
           <a:p>
             <a:fld id="{0595B4A7-9DB2-4447-8021-95C708EC3C68}" type="datetimeFigureOut">
               <a:rPr lang="zh-CN" altLang="en-US" smtClean="0"/>
-              <a:t>2023/5/8</a:t>
+              <a:t>2023/6/1</a:t>
             </a:fld>
             <a:endParaRPr lang="zh-CN" altLang="en-US"/>
           </a:p>
@@ -6282,7 +6306,7 @@
           <a:p>
             <a:fld id="{0595B4A7-9DB2-4447-8021-95C708EC3C68}" type="datetimeFigureOut">
               <a:rPr lang="zh-CN" altLang="en-US" smtClean="0"/>
-              <a:t>2023/5/8</a:t>
+              <a:t>2023/6/1</a:t>
             </a:fld>
             <a:endParaRPr lang="zh-CN" altLang="en-US"/>
           </a:p>
@@ -6488,7 +6512,7 @@
           <a:p>
             <a:fld id="{0595B4A7-9DB2-4447-8021-95C708EC3C68}" type="datetimeFigureOut">
               <a:rPr lang="zh-CN" altLang="en-US" smtClean="0"/>
-              <a:t>2023/5/8</a:t>
+              <a:t>2023/6/1</a:t>
             </a:fld>
             <a:endParaRPr lang="zh-CN" altLang="en-US"/>
           </a:p>
@@ -7022,7 +7046,7 @@
           <a:p>
             <a:fld id="{0595B4A7-9DB2-4447-8021-95C708EC3C68}" type="datetimeFigureOut">
               <a:rPr lang="zh-CN" altLang="en-US" smtClean="0"/>
-              <a:t>2023/5/8</a:t>
+              <a:t>2023/6/1</a:t>
             </a:fld>
             <a:endParaRPr lang="zh-CN" altLang="en-US"/>
           </a:p>
@@ -13104,7 +13128,7 @@
         </p:blipFill>
         <p:spPr>
           <a:xfrm>
-            <a:off x="3506470" y="3683635"/>
+            <a:off x="3863656" y="4417281"/>
             <a:ext cx="4464685" cy="2332355"/>
           </a:xfrm>
           <a:prstGeom prst="rect">

</xml_diff>